<commit_message>
files of the project added
</commit_message>
<xml_diff>
--- a/presentation.pptx
+++ b/presentation.pptx
@@ -13,12 +13,6 @@
     <p:sldId id="261" r:id="rId12"/>
     <p:sldId id="262" r:id="rId13"/>
     <p:sldId id="263" r:id="rId14"/>
-    <p:sldId id="264" r:id="rId15"/>
-    <p:sldId id="265" r:id="rId16"/>
-    <p:sldId id="266" r:id="rId17"/>
-    <p:sldId id="267" r:id="rId18"/>
-    <p:sldId id="268" r:id="rId19"/>
-    <p:sldId id="269" r:id="rId20"/>
   </p:sldIdLst>
   <p:sldSz cx="9144000" cy="6858000" type="screen4x3"/>
   <p:notesSz cx="6858000" cy="9144000"/>
@@ -3117,7 +3111,7 @@
           <a:lstStyle/>
           <a:p>
             <a:r>
-              <a:t>The Universe</a:t>
+              <a:t>The Pursuit of Happiness</a:t>
             </a:r>
           </a:p>
         </p:txBody>
@@ -3138,429 +3132,7 @@
           <a:lstStyle/>
           <a:p>
             <a:r>
-              <a:t>Exploring the Vast Cosmos</a:t>
-            </a:r>
-          </a:p>
-        </p:txBody>
-      </p:sp>
-    </p:spTree>
-  </p:cSld>
-  <p:clrMapOvr>
-    <a:masterClrMapping/>
-  </p:clrMapOvr>
-</p:sld>
-</file>
-
-<file path=ppt/slides/slide10.xml><?xml version="1.0" encoding="utf-8"?>
-<p:sld xmlns:a="http://schemas.openxmlformats.org/drawingml/2006/main" xmlns:p="http://schemas.openxmlformats.org/presentationml/2006/main" xmlns:r="http://schemas.openxmlformats.org/officeDocument/2006/relationships">
-  <p:cSld>
-    <p:spTree>
-      <p:nvGrpSpPr>
-        <p:cNvPr id="1" name=""/>
-        <p:cNvGrpSpPr/>
-        <p:nvPr/>
-      </p:nvGrpSpPr>
-      <p:grpSpPr/>
-      <p:sp>
-        <p:nvSpPr>
-          <p:cNvPr id="2" name="Title 1"/>
-          <p:cNvSpPr>
-            <a:spLocks noGrp="1"/>
-          </p:cNvSpPr>
-          <p:nvPr>
-            <p:ph type="title"/>
-          </p:nvPr>
-        </p:nvSpPr>
-        <p:spPr/>
-        <p:txBody>
-          <a:bodyPr/>
-          <a:lstStyle/>
-          <a:p>
-            <a:r>
-              <a:t>Key Components of the Universe</a:t>
-            </a:r>
-          </a:p>
-        </p:txBody>
-      </p:sp>
-      <p:sp>
-        <p:nvSpPr>
-          <p:cNvPr id="3" name="Content Placeholder 2"/>
-          <p:cNvSpPr>
-            <a:spLocks noGrp="1"/>
-          </p:cNvSpPr>
-          <p:nvPr>
-            <p:ph idx="1"/>
-          </p:nvPr>
-        </p:nvSpPr>
-        <p:spPr/>
-        <p:txBody>
-          <a:bodyPr/>
-          <a:lstStyle/>
-          <a:p/>
-          <a:p>
-            <a:pPr/>
-            <a:r>
-              <a:t>Galaxies: Massive systems of stars, gas, and dark matter</a:t>
-            </a:r>
-          </a:p>
-          <a:p>
-            <a:pPr/>
-            <a:r>
-              <a:t>Stars: Luminous celestial bodies powered by nuclear fusion</a:t>
-            </a:r>
-          </a:p>
-          <a:p>
-            <a:pPr/>
-            <a:r>
-              <a:t>Planets: Diverse worlds orbiting stars</a:t>
-            </a:r>
-          </a:p>
-          <a:p>
-            <a:pPr/>
-            <a:r>
-              <a:t>Nebulae: Clouds of gas and dust, often stellar nurseries</a:t>
-            </a:r>
-          </a:p>
-          <a:p>
-            <a:pPr/>
-            <a:r>
-              <a:t>Dark Matter &amp; Dark Energy: Mysterious substances shaping the cosmos</a:t>
-            </a:r>
-          </a:p>
-        </p:txBody>
-      </p:sp>
-    </p:spTree>
-  </p:cSld>
-  <p:clrMapOvr>
-    <a:masterClrMapping/>
-  </p:clrMapOvr>
-</p:sld>
-</file>
-
-<file path=ppt/slides/slide11.xml><?xml version="1.0" encoding="utf-8"?>
-<p:sld xmlns:a="http://schemas.openxmlformats.org/drawingml/2006/main" xmlns:p="http://schemas.openxmlformats.org/presentationml/2006/main" xmlns:r="http://schemas.openxmlformats.org/officeDocument/2006/relationships">
-  <p:cSld>
-    <p:spTree>
-      <p:nvGrpSpPr>
-        <p:cNvPr id="1" name=""/>
-        <p:cNvGrpSpPr/>
-        <p:nvPr/>
-      </p:nvGrpSpPr>
-      <p:grpSpPr/>
-      <p:sp>
-        <p:nvSpPr>
-          <p:cNvPr id="2" name="Title 1"/>
-          <p:cNvSpPr>
-            <a:spLocks noGrp="1"/>
-          </p:cNvSpPr>
-          <p:nvPr>
-            <p:ph type="title"/>
-          </p:nvPr>
-        </p:nvSpPr>
-        <p:spPr/>
-        <p:txBody>
-          <a:bodyPr/>
-          <a:lstStyle/>
-          <a:p>
-            <a:r>
-              <a:t>Galaxies</a:t>
-            </a:r>
-          </a:p>
-        </p:txBody>
-      </p:sp>
-      <p:sp>
-        <p:nvSpPr>
-          <p:cNvPr id="3" name="Picture Placeholder 2"/>
-          <p:cNvSpPr>
-            <a:spLocks noGrp="1"/>
-          </p:cNvSpPr>
-          <p:nvPr>
-            <p:ph type="pic" idx="1"/>
-          </p:nvPr>
-        </p:nvSpPr>
-        <p:spPr>
-          <a:solidFill/>
-        </p:spPr>
-      </p:sp>
-      <p:sp>
-        <p:nvSpPr>
-          <p:cNvPr id="4" name="Text Placeholder 3"/>
-          <p:cNvSpPr>
-            <a:spLocks noGrp="1"/>
-          </p:cNvSpPr>
-          <p:nvPr>
-            <p:ph type="body" idx="2" sz="half"/>
-          </p:nvPr>
-        </p:nvSpPr>
-        <p:spPr/>
-        <p:txBody>
-          <a:bodyPr/>
-          <a:lstStyle/>
-          <a:p>
-            <a:r>
-              <a:t>Galaxies are enormous systems of stars, gas, and dark matter, held together by gravity.</a:t>
-            </a:r>
-          </a:p>
-        </p:txBody>
-      </p:sp>
-      <p:pic>
-        <p:nvPicPr>
-          <p:cNvPr id="5" name="Picture 4" descr="image.jpg"/>
-          <p:cNvPicPr>
-            <a:picLocks noChangeAspect="1"/>
-          </p:cNvPicPr>
-          <p:nvPr/>
-        </p:nvPicPr>
-        <p:blipFill>
-          <a:blip r:embed="rId2"/>
-          <a:stretch>
-            <a:fillRect/>
-          </a:stretch>
-        </p:blipFill>
-        <p:spPr>
-          <a:xfrm>
-            <a:off x="1792288" y="612775"/>
-            <a:ext cx="5486400" cy="4114800"/>
-          </a:xfrm>
-          <a:prstGeom prst="rect">
-            <a:avLst/>
-          </a:prstGeom>
-        </p:spPr>
-      </p:pic>
-    </p:spTree>
-  </p:cSld>
-  <p:clrMapOvr>
-    <a:masterClrMapping/>
-  </p:clrMapOvr>
-</p:sld>
-</file>
-
-<file path=ppt/slides/slide12.xml><?xml version="1.0" encoding="utf-8"?>
-<p:sld xmlns:a="http://schemas.openxmlformats.org/drawingml/2006/main" xmlns:p="http://schemas.openxmlformats.org/presentationml/2006/main" xmlns:r="http://schemas.openxmlformats.org/officeDocument/2006/relationships">
-  <p:cSld>
-    <p:spTree>
-      <p:nvGrpSpPr>
-        <p:cNvPr id="1" name=""/>
-        <p:cNvGrpSpPr/>
-        <p:nvPr/>
-      </p:nvGrpSpPr>
-      <p:grpSpPr/>
-      <p:sp>
-        <p:nvSpPr>
-          <p:cNvPr id="2" name="Title 1"/>
-          <p:cNvSpPr>
-            <a:spLocks noGrp="1"/>
-          </p:cNvSpPr>
-          <p:nvPr>
-            <p:ph type="title"/>
-          </p:nvPr>
-        </p:nvSpPr>
-        <p:spPr/>
-        <p:txBody>
-          <a:bodyPr/>
-          <a:lstStyle/>
-          <a:p>
-            <a:r>
-              <a:t>Black Holes</a:t>
-            </a:r>
-          </a:p>
-        </p:txBody>
-      </p:sp>
-      <p:sp>
-        <p:nvSpPr>
-          <p:cNvPr id="3" name="Content Placeholder 2"/>
-          <p:cNvSpPr>
-            <a:spLocks noGrp="1"/>
-          </p:cNvSpPr>
-          <p:nvPr>
-            <p:ph idx="1"/>
-          </p:nvPr>
-        </p:nvSpPr>
-        <p:spPr/>
-        <p:txBody>
-          <a:bodyPr/>
-          <a:lstStyle/>
-          <a:p/>
-          <a:p>
-            <a:pPr/>
-            <a:r>
-              <a:t>Formed when massive stars collapse under their own gravity</a:t>
-            </a:r>
-          </a:p>
-          <a:p>
-            <a:pPr/>
-            <a:r>
-              <a:t>Regions where gravity is so strong that not even light can escape</a:t>
-            </a:r>
-          </a:p>
-          <a:p>
-            <a:pPr/>
-            <a:r>
-              <a:t>Found at the centers of many galaxies, including the Milky Way</a:t>
-            </a:r>
-          </a:p>
-          <a:p>
-            <a:pPr/>
-            <a:r>
-              <a:t>Critical for understanding spacetime and relativity</a:t>
-            </a:r>
-          </a:p>
-        </p:txBody>
-      </p:sp>
-    </p:spTree>
-  </p:cSld>
-  <p:clrMapOvr>
-    <a:masterClrMapping/>
-  </p:clrMapOvr>
-</p:sld>
-</file>
-
-<file path=ppt/slides/slide13.xml><?xml version="1.0" encoding="utf-8"?>
-<p:sld xmlns:a="http://schemas.openxmlformats.org/drawingml/2006/main" xmlns:p="http://schemas.openxmlformats.org/presentationml/2006/main" xmlns:r="http://schemas.openxmlformats.org/officeDocument/2006/relationships">
-  <p:cSld>
-    <p:spTree>
-      <p:nvGrpSpPr>
-        <p:cNvPr id="1" name=""/>
-        <p:cNvGrpSpPr/>
-        <p:nvPr/>
-      </p:nvGrpSpPr>
-      <p:grpSpPr/>
-      <p:sp>
-        <p:nvSpPr>
-          <p:cNvPr id="2" name="Title 1"/>
-          <p:cNvSpPr>
-            <a:spLocks noGrp="1"/>
-          </p:cNvSpPr>
-          <p:nvPr>
-            <p:ph type="title"/>
-          </p:nvPr>
-        </p:nvSpPr>
-        <p:spPr/>
-        <p:txBody>
-          <a:bodyPr/>
-          <a:lstStyle/>
-          <a:p>
-            <a:r>
-              <a:t>The Milky Way</a:t>
-            </a:r>
-          </a:p>
-        </p:txBody>
-      </p:sp>
-      <p:sp>
-        <p:nvSpPr>
-          <p:cNvPr id="3" name="Picture Placeholder 2"/>
-          <p:cNvSpPr>
-            <a:spLocks noGrp="1"/>
-          </p:cNvSpPr>
-          <p:nvPr>
-            <p:ph type="pic" idx="1"/>
-          </p:nvPr>
-        </p:nvSpPr>
-        <p:spPr>
-          <a:solidFill/>
-        </p:spPr>
-      </p:sp>
-      <p:sp>
-        <p:nvSpPr>
-          <p:cNvPr id="4" name="Text Placeholder 3"/>
-          <p:cNvSpPr>
-            <a:spLocks noGrp="1"/>
-          </p:cNvSpPr>
-          <p:nvPr>
-            <p:ph type="body" idx="2" sz="half"/>
-          </p:nvPr>
-        </p:nvSpPr>
-        <p:spPr/>
-        <p:txBody>
-          <a:bodyPr/>
-          <a:lstStyle/>
-          <a:p>
-            <a:r>
-              <a:t>Our home galaxy, containing billions of stars and solar systems.</a:t>
-            </a:r>
-          </a:p>
-        </p:txBody>
-      </p:sp>
-      <p:pic>
-        <p:nvPicPr>
-          <p:cNvPr id="5" name="Picture 4" descr="image.jpg"/>
-          <p:cNvPicPr>
-            <a:picLocks noChangeAspect="1"/>
-          </p:cNvPicPr>
-          <p:nvPr/>
-        </p:nvPicPr>
-        <p:blipFill>
-          <a:blip r:embed="rId2"/>
-          <a:stretch>
-            <a:fillRect/>
-          </a:stretch>
-        </p:blipFill>
-        <p:spPr>
-          <a:xfrm>
-            <a:off x="1792288" y="612775"/>
-            <a:ext cx="5486400" cy="4114800"/>
-          </a:xfrm>
-          <a:prstGeom prst="rect">
-            <a:avLst/>
-          </a:prstGeom>
-        </p:spPr>
-      </p:pic>
-    </p:spTree>
-  </p:cSld>
-  <p:clrMapOvr>
-    <a:masterClrMapping/>
-  </p:clrMapOvr>
-</p:sld>
-</file>
-
-<file path=ppt/slides/slide14.xml><?xml version="1.0" encoding="utf-8"?>
-<p:sld xmlns:a="http://schemas.openxmlformats.org/drawingml/2006/main" xmlns:p="http://schemas.openxmlformats.org/presentationml/2006/main" xmlns:r="http://schemas.openxmlformats.org/officeDocument/2006/relationships">
-  <p:cSld>
-    <p:spTree>
-      <p:nvGrpSpPr>
-        <p:cNvPr id="1" name=""/>
-        <p:cNvGrpSpPr/>
-        <p:nvPr/>
-      </p:nvGrpSpPr>
-      <p:grpSpPr/>
-      <p:sp>
-        <p:nvSpPr>
-          <p:cNvPr id="2" name="Title 1"/>
-          <p:cNvSpPr>
-            <a:spLocks noGrp="1"/>
-          </p:cNvSpPr>
-          <p:nvPr>
-            <p:ph type="title"/>
-          </p:nvPr>
-        </p:nvSpPr>
-        <p:spPr/>
-        <p:txBody>
-          <a:bodyPr/>
-          <a:lstStyle/>
-          <a:p>
-            <a:r>
-              <a:t>Conclusion</a:t>
-            </a:r>
-          </a:p>
-        </p:txBody>
-      </p:sp>
-      <p:sp>
-        <p:nvSpPr>
-          <p:cNvPr id="3" name="Content Placeholder 2"/>
-          <p:cNvSpPr>
-            <a:spLocks noGrp="1"/>
-          </p:cNvSpPr>
-          <p:nvPr>
-            <p:ph idx="1"/>
-          </p:nvPr>
-        </p:nvSpPr>
-        <p:spPr/>
-        <p:txBody>
-          <a:bodyPr/>
-          <a:lstStyle/>
-          <a:p>
-            <a:r>
-              <a:t>The universe is a vast and complex system, full of mysteries yet to be unraveled. From the smallest particles to the largest cosmic structures, it invites us to explore and discover.</a:t>
+              <a:t>Understanding the Path to Fulfillment and Joy</a:t>
             </a:r>
           </a:p>
         </p:txBody>
@@ -3599,7 +3171,7 @@
           <a:lstStyle/>
           <a:p>
             <a:r>
-              <a:t>Introduction</a:t>
+              <a:t>Topics to be Covered</a:t>
             </a:r>
           </a:p>
         </p:txBody>
@@ -3618,9 +3190,29 @@
         <p:txBody>
           <a:bodyPr/>
           <a:lstStyle/>
-          <a:p>
-            <a:r>
-              <a:t>The universe encompasses all of space, time, matter, and energy. It includes galaxies, stars, planets, and the vast voids in between.</a:t>
+          <a:p/>
+          <a:p>
+            <a:pPr/>
+            <a:r>
+              <a:t>Concept of Happiness</a:t>
+            </a:r>
+          </a:p>
+          <a:p>
+            <a:pPr/>
+            <a:r>
+              <a:t>Factors Influencing Happiness</a:t>
+            </a:r>
+          </a:p>
+          <a:p>
+            <a:pPr/>
+            <a:r>
+              <a:t>Philosophical Views on Happiness</a:t>
+            </a:r>
+          </a:p>
+          <a:p>
+            <a:pPr/>
+            <a:r>
+              <a:t>The Importance of Happiness</a:t>
             </a:r>
           </a:p>
         </p:txBody>
@@ -3659,7 +3251,7 @@
           <a:lstStyle/>
           <a:p>
             <a:r>
-              <a:t>Key Components of the Universe</a:t>
+              <a:t>What is Happiness?</a:t>
             </a:r>
           </a:p>
         </p:txBody>
@@ -3678,35 +3270,9 @@
         <p:txBody>
           <a:bodyPr/>
           <a:lstStyle/>
-          <a:p/>
-          <a:p>
-            <a:pPr/>
-            <a:r>
-              <a:t>Galaxies: Massive systems of stars, gas, and dark matter</a:t>
-            </a:r>
-          </a:p>
-          <a:p>
-            <a:pPr/>
-            <a:r>
-              <a:t>Stars: Luminous celestial bodies powered by nuclear fusion</a:t>
-            </a:r>
-          </a:p>
-          <a:p>
-            <a:pPr/>
-            <a:r>
-              <a:t>Planets: Diverse worlds orbiting stars</a:t>
-            </a:r>
-          </a:p>
-          <a:p>
-            <a:pPr/>
-            <a:r>
-              <a:t>Nebulae: Clouds of gas and dust, often stellar nurseries</a:t>
-            </a:r>
-          </a:p>
-          <a:p>
-            <a:pPr/>
-            <a:r>
-              <a:t>Dark Matter &amp; Dark Energy: Mysterious substances shaping the cosmos</a:t>
+          <a:p>
+            <a:r>
+              <a:t>Happiness is often defined as a state of well-being, joy, and contentment. It can be influenced by internal and external factors and varies from person to person.</a:t>
             </a:r>
           </a:p>
         </p:txBody>
@@ -3745,7 +3311,93 @@
           <a:lstStyle/>
           <a:p>
             <a:r>
-              <a:t>Galaxies</a:t>
+              <a:t>Factors Influencing Happiness</a:t>
+            </a:r>
+          </a:p>
+        </p:txBody>
+      </p:sp>
+      <p:sp>
+        <p:nvSpPr>
+          <p:cNvPr id="3" name="Content Placeholder 2"/>
+          <p:cNvSpPr>
+            <a:spLocks noGrp="1"/>
+          </p:cNvSpPr>
+          <p:nvPr>
+            <p:ph idx="1"/>
+          </p:nvPr>
+        </p:nvSpPr>
+        <p:spPr/>
+        <p:txBody>
+          <a:bodyPr/>
+          <a:lstStyle/>
+          <a:p/>
+          <a:p>
+            <a:pPr/>
+            <a:r>
+              <a:t>Personal Relationships</a:t>
+            </a:r>
+          </a:p>
+          <a:p>
+            <a:pPr/>
+            <a:r>
+              <a:t>Health and Well-being</a:t>
+            </a:r>
+          </a:p>
+          <a:p>
+            <a:pPr/>
+            <a:r>
+              <a:t>Financial Stability</a:t>
+            </a:r>
+          </a:p>
+          <a:p>
+            <a:pPr/>
+            <a:r>
+              <a:t>Purpose and Fulfillment</a:t>
+            </a:r>
+          </a:p>
+          <a:p>
+            <a:pPr/>
+            <a:r>
+              <a:t>Gratitude and Positivity</a:t>
+            </a:r>
+          </a:p>
+        </p:txBody>
+      </p:sp>
+    </p:spTree>
+  </p:cSld>
+  <p:clrMapOvr>
+    <a:masterClrMapping/>
+  </p:clrMapOvr>
+</p:sld>
+</file>
+
+<file path=ppt/slides/slide5.xml><?xml version="1.0" encoding="utf-8"?>
+<p:sld xmlns:a="http://schemas.openxmlformats.org/drawingml/2006/main" xmlns:p="http://schemas.openxmlformats.org/presentationml/2006/main" xmlns:r="http://schemas.openxmlformats.org/officeDocument/2006/relationships">
+  <p:cSld>
+    <p:spTree>
+      <p:nvGrpSpPr>
+        <p:cNvPr id="1" name=""/>
+        <p:cNvGrpSpPr/>
+        <p:nvPr/>
+      </p:nvGrpSpPr>
+      <p:grpSpPr/>
+      <p:sp>
+        <p:nvSpPr>
+          <p:cNvPr id="2" name="Title 1"/>
+          <p:cNvSpPr>
+            <a:spLocks noGrp="1"/>
+          </p:cNvSpPr>
+          <p:nvPr>
+            <p:ph type="title"/>
+          </p:nvPr>
+        </p:nvSpPr>
+        <p:spPr/>
+        <p:txBody>
+          <a:bodyPr/>
+          <a:lstStyle/>
+          <a:p>
+            <a:r>
+              <a:t>Moments of Happiness</a:t>
             </a:r>
           </a:p>
         </p:txBody>
@@ -3780,7 +3432,7 @@
           <a:lstStyle/>
           <a:p>
             <a:r>
-              <a:t>Galaxies are enormous systems of stars, gas, and dark matter, held together by gravity.</a:t>
+              <a:t>Happiness can often be seen in the simple, joyful moments of life that bring us peace and fulfillment.</a:t>
             </a:r>
           </a:p>
         </p:txBody>
@@ -3817,86 +3469,6 @@
 </p:sld>
 </file>
 
-<file path=ppt/slides/slide5.xml><?xml version="1.0" encoding="utf-8"?>
-<p:sld xmlns:a="http://schemas.openxmlformats.org/drawingml/2006/main" xmlns:p="http://schemas.openxmlformats.org/presentationml/2006/main" xmlns:r="http://schemas.openxmlformats.org/officeDocument/2006/relationships">
-  <p:cSld>
-    <p:spTree>
-      <p:nvGrpSpPr>
-        <p:cNvPr id="1" name=""/>
-        <p:cNvGrpSpPr/>
-        <p:nvPr/>
-      </p:nvGrpSpPr>
-      <p:grpSpPr/>
-      <p:sp>
-        <p:nvSpPr>
-          <p:cNvPr id="2" name="Title 1"/>
-          <p:cNvSpPr>
-            <a:spLocks noGrp="1"/>
-          </p:cNvSpPr>
-          <p:nvPr>
-            <p:ph type="title"/>
-          </p:nvPr>
-        </p:nvSpPr>
-        <p:spPr/>
-        <p:txBody>
-          <a:bodyPr/>
-          <a:lstStyle/>
-          <a:p>
-            <a:r>
-              <a:t>Black Holes</a:t>
-            </a:r>
-          </a:p>
-        </p:txBody>
-      </p:sp>
-      <p:sp>
-        <p:nvSpPr>
-          <p:cNvPr id="3" name="Content Placeholder 2"/>
-          <p:cNvSpPr>
-            <a:spLocks noGrp="1"/>
-          </p:cNvSpPr>
-          <p:nvPr>
-            <p:ph idx="1"/>
-          </p:nvPr>
-        </p:nvSpPr>
-        <p:spPr/>
-        <p:txBody>
-          <a:bodyPr/>
-          <a:lstStyle/>
-          <a:p/>
-          <a:p>
-            <a:pPr/>
-            <a:r>
-              <a:t>Formed when massive stars collapse under their own gravity</a:t>
-            </a:r>
-          </a:p>
-          <a:p>
-            <a:pPr/>
-            <a:r>
-              <a:t>Regions where gravity is so strong that not even light can escape</a:t>
-            </a:r>
-          </a:p>
-          <a:p>
-            <a:pPr/>
-            <a:r>
-              <a:t>Found at the centers of many galaxies, including the Milky Way</a:t>
-            </a:r>
-          </a:p>
-          <a:p>
-            <a:pPr/>
-            <a:r>
-              <a:t>Critical for understanding spacetime and relativity</a:t>
-            </a:r>
-          </a:p>
-        </p:txBody>
-      </p:sp>
-    </p:spTree>
-  </p:cSld>
-  <p:clrMapOvr>
-    <a:masterClrMapping/>
-  </p:clrMapOvr>
-</p:sld>
-</file>
-
 <file path=ppt/slides/slide6.xml><?xml version="1.0" encoding="utf-8"?>
 <p:sld xmlns:a="http://schemas.openxmlformats.org/drawingml/2006/main" xmlns:p="http://schemas.openxmlformats.org/presentationml/2006/main" xmlns:r="http://schemas.openxmlformats.org/officeDocument/2006/relationships">
   <p:cSld>
@@ -3923,7 +3495,87 @@
           <a:lstStyle/>
           <a:p>
             <a:r>
-              <a:t>The Milky Way</a:t>
+              <a:t>Philosophical Views on Happiness</a:t>
+            </a:r>
+          </a:p>
+        </p:txBody>
+      </p:sp>
+      <p:sp>
+        <p:nvSpPr>
+          <p:cNvPr id="3" name="Content Placeholder 2"/>
+          <p:cNvSpPr>
+            <a:spLocks noGrp="1"/>
+          </p:cNvSpPr>
+          <p:nvPr>
+            <p:ph idx="1"/>
+          </p:nvPr>
+        </p:nvSpPr>
+        <p:spPr/>
+        <p:txBody>
+          <a:bodyPr/>
+          <a:lstStyle/>
+          <a:p/>
+          <a:p>
+            <a:pPr/>
+            <a:r>
+              <a:t>Aristotle: Happiness through Virtue</a:t>
+            </a:r>
+          </a:p>
+          <a:p>
+            <a:pPr/>
+            <a:r>
+              <a:t>Utilitarianism: Maximizing Pleasure</a:t>
+            </a:r>
+          </a:p>
+          <a:p>
+            <a:pPr/>
+            <a:r>
+              <a:t>Hedonism: Pursuit of Pleasure</a:t>
+            </a:r>
+          </a:p>
+          <a:p>
+            <a:pPr/>
+            <a:r>
+              <a:t>Existentialism: Creating Meaning</a:t>
+            </a:r>
+          </a:p>
+        </p:txBody>
+      </p:sp>
+    </p:spTree>
+  </p:cSld>
+  <p:clrMapOvr>
+    <a:masterClrMapping/>
+  </p:clrMapOvr>
+</p:sld>
+</file>
+
+<file path=ppt/slides/slide7.xml><?xml version="1.0" encoding="utf-8"?>
+<p:sld xmlns:a="http://schemas.openxmlformats.org/drawingml/2006/main" xmlns:p="http://schemas.openxmlformats.org/presentationml/2006/main" xmlns:r="http://schemas.openxmlformats.org/officeDocument/2006/relationships">
+  <p:cSld>
+    <p:spTree>
+      <p:nvGrpSpPr>
+        <p:cNvPr id="1" name=""/>
+        <p:cNvGrpSpPr/>
+        <p:nvPr/>
+      </p:nvGrpSpPr>
+      <p:grpSpPr/>
+      <p:sp>
+        <p:nvSpPr>
+          <p:cNvPr id="2" name="Title 1"/>
+          <p:cNvSpPr>
+            <a:spLocks noGrp="1"/>
+          </p:cNvSpPr>
+          <p:nvPr>
+            <p:ph type="title"/>
+          </p:nvPr>
+        </p:nvSpPr>
+        <p:spPr/>
+        <p:txBody>
+          <a:bodyPr/>
+          <a:lstStyle/>
+          <a:p>
+            <a:r>
+              <a:t>Happy Moments in Life</a:t>
             </a:r>
           </a:p>
         </p:txBody>
@@ -3958,7 +3610,7 @@
           <a:lstStyle/>
           <a:p>
             <a:r>
-              <a:t>Our home galaxy, containing billions of stars and solar systems.</a:t>
+              <a:t>Happy moments can be found in lifeâ€™s simple pleasures, such as spending time with loved ones, celebrating milestones, and enjoying nature.</a:t>
             </a:r>
           </a:p>
         </p:txBody>
@@ -3995,66 +3647,6 @@
 </p:sld>
 </file>
 
-<file path=ppt/slides/slide7.xml><?xml version="1.0" encoding="utf-8"?>
-<p:sld xmlns:a="http://schemas.openxmlformats.org/drawingml/2006/main" xmlns:p="http://schemas.openxmlformats.org/presentationml/2006/main" xmlns:r="http://schemas.openxmlformats.org/officeDocument/2006/relationships">
-  <p:cSld>
-    <p:spTree>
-      <p:nvGrpSpPr>
-        <p:cNvPr id="1" name=""/>
-        <p:cNvGrpSpPr/>
-        <p:nvPr/>
-      </p:nvGrpSpPr>
-      <p:grpSpPr/>
-      <p:sp>
-        <p:nvSpPr>
-          <p:cNvPr id="2" name="Title 1"/>
-          <p:cNvSpPr>
-            <a:spLocks noGrp="1"/>
-          </p:cNvSpPr>
-          <p:nvPr>
-            <p:ph type="title"/>
-          </p:nvPr>
-        </p:nvSpPr>
-        <p:spPr/>
-        <p:txBody>
-          <a:bodyPr/>
-          <a:lstStyle/>
-          <a:p>
-            <a:r>
-              <a:t>Conclusion</a:t>
-            </a:r>
-          </a:p>
-        </p:txBody>
-      </p:sp>
-      <p:sp>
-        <p:nvSpPr>
-          <p:cNvPr id="3" name="Content Placeholder 2"/>
-          <p:cNvSpPr>
-            <a:spLocks noGrp="1"/>
-          </p:cNvSpPr>
-          <p:nvPr>
-            <p:ph idx="1"/>
-          </p:nvPr>
-        </p:nvSpPr>
-        <p:spPr/>
-        <p:txBody>
-          <a:bodyPr/>
-          <a:lstStyle/>
-          <a:p>
-            <a:r>
-              <a:t>The universe is a vast and complex system, full of mysteries yet to be unraveled. From the smallest particles to the largest cosmic structures, it invites us to explore and discover.</a:t>
-            </a:r>
-          </a:p>
-        </p:txBody>
-      </p:sp>
-    </p:spTree>
-  </p:cSld>
-  <p:clrMapOvr>
-    <a:masterClrMapping/>
-  </p:clrMapOvr>
-</p:sld>
-</file>
-
 <file path=ppt/slides/slide8.xml><?xml version="1.0" encoding="utf-8"?>
 <p:sld xmlns:a="http://schemas.openxmlformats.org/drawingml/2006/main" xmlns:p="http://schemas.openxmlformats.org/presentationml/2006/main" xmlns:r="http://schemas.openxmlformats.org/officeDocument/2006/relationships">
   <p:cSld>
@@ -4072,66 +3664,6 @@
             <a:spLocks noGrp="1"/>
           </p:cNvSpPr>
           <p:nvPr>
-            <p:ph type="ctrTitle"/>
-          </p:nvPr>
-        </p:nvSpPr>
-        <p:spPr/>
-        <p:txBody>
-          <a:bodyPr/>
-          <a:lstStyle/>
-          <a:p>
-            <a:r>
-              <a:t>The Universe</a:t>
-            </a:r>
-          </a:p>
-        </p:txBody>
-      </p:sp>
-      <p:sp>
-        <p:nvSpPr>
-          <p:cNvPr id="3" name="Subtitle 2"/>
-          <p:cNvSpPr>
-            <a:spLocks noGrp="1"/>
-          </p:cNvSpPr>
-          <p:nvPr>
-            <p:ph type="subTitle" idx="1"/>
-          </p:nvPr>
-        </p:nvSpPr>
-        <p:spPr/>
-        <p:txBody>
-          <a:bodyPr/>
-          <a:lstStyle/>
-          <a:p>
-            <a:r>
-              <a:t>Exploring the Vast Cosmos</a:t>
-            </a:r>
-          </a:p>
-        </p:txBody>
-      </p:sp>
-    </p:spTree>
-  </p:cSld>
-  <p:clrMapOvr>
-    <a:masterClrMapping/>
-  </p:clrMapOvr>
-</p:sld>
-</file>
-
-<file path=ppt/slides/slide9.xml><?xml version="1.0" encoding="utf-8"?>
-<p:sld xmlns:a="http://schemas.openxmlformats.org/drawingml/2006/main" xmlns:p="http://schemas.openxmlformats.org/presentationml/2006/main" xmlns:r="http://schemas.openxmlformats.org/officeDocument/2006/relationships">
-  <p:cSld>
-    <p:spTree>
-      <p:nvGrpSpPr>
-        <p:cNvPr id="1" name=""/>
-        <p:cNvGrpSpPr/>
-        <p:nvPr/>
-      </p:nvGrpSpPr>
-      <p:grpSpPr/>
-      <p:sp>
-        <p:nvSpPr>
-          <p:cNvPr id="2" name="Title 1"/>
-          <p:cNvSpPr>
-            <a:spLocks noGrp="1"/>
-          </p:cNvSpPr>
-          <p:nvPr>
             <p:ph type="title"/>
           </p:nvPr>
         </p:nvSpPr>
@@ -4141,7 +3673,7 @@
           <a:lstStyle/>
           <a:p>
             <a:r>
-              <a:t>Introduction</a:t>
+              <a:t>Conclusion</a:t>
             </a:r>
           </a:p>
         </p:txBody>
@@ -4162,7 +3694,7 @@
           <a:lstStyle/>
           <a:p>
             <a:r>
-              <a:t>The universe encompasses all of space, time, matter, and energy. It includes galaxies, stars, planets, and the vast voids in between.</a:t>
+              <a:t>The pursuit of happiness is a universal goal. It requires balance, self-awareness, and a focus on what truly brings joy and fulfillment in life.</a:t>
             </a:r>
           </a:p>
         </p:txBody>

</xml_diff>